<commit_message>
update dates and data slides
</commit_message>
<xml_diff>
--- a/docs/slides/Good_Data_Practices.pptx
+++ b/docs/slides/Good_Data_Practices.pptx
@@ -141,6 +141,9 @@
     <p:ext uri="{EFAFB233-063F-42B5-8137-9DF3F51BA10A}">
       <p15:sldGuideLst xmlns:p15="http://schemas.microsoft.com/office/powerpoint/2012/main"/>
     </p:ext>
+    <p:ext uri="{2D200454-40CA-4A62-9FC3-DE9A4176ACB9}">
+      <p15:notesGuideLst xmlns:p15="http://schemas.microsoft.com/office/powerpoint/2012/main"/>
+    </p:ext>
   </p:extLst>
 </p:presentation>
 </file>
@@ -227,7 +230,7 @@
           <a:p>
             <a:fld id="{24F8C2F4-F781-034D-A742-B6D3765181E6}" type="datetimeFigureOut">
               <a:rPr lang="en-US" smtClean="0"/>
-              <a:t>7/13/23</a:t>
+              <a:t>6/28/24</a:t>
             </a:fld>
             <a:endParaRPr lang="en-US"/>
           </a:p>
@@ -2851,7 +2854,7 @@
           <a:p>
             <a:fld id="{BC2E0F42-2732-0946-871B-2BECB08500FA}" type="datetimeFigureOut">
               <a:rPr lang="en-US" smtClean="0"/>
-              <a:t>7/13/23</a:t>
+              <a:t>6/28/24</a:t>
             </a:fld>
             <a:endParaRPr lang="en-US"/>
           </a:p>
@@ -3049,7 +3052,7 @@
           <a:p>
             <a:fld id="{BC2E0F42-2732-0946-871B-2BECB08500FA}" type="datetimeFigureOut">
               <a:rPr lang="en-US" smtClean="0"/>
-              <a:t>7/13/23</a:t>
+              <a:t>6/28/24</a:t>
             </a:fld>
             <a:endParaRPr lang="en-US"/>
           </a:p>
@@ -3257,7 +3260,7 @@
           <a:p>
             <a:fld id="{BC2E0F42-2732-0946-871B-2BECB08500FA}" type="datetimeFigureOut">
               <a:rPr lang="en-US" smtClean="0"/>
-              <a:t>7/13/23</a:t>
+              <a:t>6/28/24</a:t>
             </a:fld>
             <a:endParaRPr lang="en-US"/>
           </a:p>
@@ -3455,7 +3458,7 @@
           <a:p>
             <a:fld id="{BC2E0F42-2732-0946-871B-2BECB08500FA}" type="datetimeFigureOut">
               <a:rPr lang="en-US" smtClean="0"/>
-              <a:t>7/13/23</a:t>
+              <a:t>6/28/24</a:t>
             </a:fld>
             <a:endParaRPr lang="en-US"/>
           </a:p>
@@ -3730,7 +3733,7 @@
           <a:p>
             <a:fld id="{BC2E0F42-2732-0946-871B-2BECB08500FA}" type="datetimeFigureOut">
               <a:rPr lang="en-US" smtClean="0"/>
-              <a:t>7/13/23</a:t>
+              <a:t>6/28/24</a:t>
             </a:fld>
             <a:endParaRPr lang="en-US"/>
           </a:p>
@@ -3995,7 +3998,7 @@
           <a:p>
             <a:fld id="{BC2E0F42-2732-0946-871B-2BECB08500FA}" type="datetimeFigureOut">
               <a:rPr lang="en-US" smtClean="0"/>
-              <a:t>7/13/23</a:t>
+              <a:t>6/28/24</a:t>
             </a:fld>
             <a:endParaRPr lang="en-US"/>
           </a:p>
@@ -4407,7 +4410,7 @@
           <a:p>
             <a:fld id="{BC2E0F42-2732-0946-871B-2BECB08500FA}" type="datetimeFigureOut">
               <a:rPr lang="en-US" smtClean="0"/>
-              <a:t>7/13/23</a:t>
+              <a:t>6/28/24</a:t>
             </a:fld>
             <a:endParaRPr lang="en-US"/>
           </a:p>
@@ -4548,7 +4551,7 @@
           <a:p>
             <a:fld id="{BC2E0F42-2732-0946-871B-2BECB08500FA}" type="datetimeFigureOut">
               <a:rPr lang="en-US" smtClean="0"/>
-              <a:t>7/13/23</a:t>
+              <a:t>6/28/24</a:t>
             </a:fld>
             <a:endParaRPr lang="en-US"/>
           </a:p>
@@ -4661,7 +4664,7 @@
           <a:p>
             <a:fld id="{BC2E0F42-2732-0946-871B-2BECB08500FA}" type="datetimeFigureOut">
               <a:rPr lang="en-US" smtClean="0"/>
-              <a:t>7/13/23</a:t>
+              <a:t>6/28/24</a:t>
             </a:fld>
             <a:endParaRPr lang="en-US"/>
           </a:p>
@@ -4972,7 +4975,7 @@
           <a:p>
             <a:fld id="{BC2E0F42-2732-0946-871B-2BECB08500FA}" type="datetimeFigureOut">
               <a:rPr lang="en-US" smtClean="0"/>
-              <a:t>7/13/23</a:t>
+              <a:t>6/28/24</a:t>
             </a:fld>
             <a:endParaRPr lang="en-US"/>
           </a:p>
@@ -5260,7 +5263,7 @@
           <a:p>
             <a:fld id="{BC2E0F42-2732-0946-871B-2BECB08500FA}" type="datetimeFigureOut">
               <a:rPr lang="en-US" smtClean="0"/>
-              <a:t>7/13/23</a:t>
+              <a:t>6/28/24</a:t>
             </a:fld>
             <a:endParaRPr lang="en-US"/>
           </a:p>
@@ -5501,7 +5504,7 @@
           <a:p>
             <a:fld id="{BC2E0F42-2732-0946-871B-2BECB08500FA}" type="datetimeFigureOut">
               <a:rPr lang="en-US" smtClean="0"/>
-              <a:t>7/13/23</a:t>
+              <a:t>6/28/24</a:t>
             </a:fld>
             <a:endParaRPr lang="en-US"/>
           </a:p>
@@ -5985,7 +5988,7 @@
           <a:p>
             <a:r>
               <a:rPr lang="en-US" dirty="0"/>
-              <a:t>Summer 2023</a:t>
+              <a:t>Summer 2024</a:t>
             </a:r>
           </a:p>
         </p:txBody>
@@ -11373,18 +11376,18 @@
         </p:nvSpPr>
         <p:spPr>
           <a:xfrm>
-            <a:off x="416689" y="1690689"/>
-            <a:ext cx="10937111" cy="4486273"/>
+            <a:off x="416689" y="1404086"/>
+            <a:ext cx="11279442" cy="5088787"/>
           </a:xfrm>
         </p:spPr>
         <p:txBody>
           <a:bodyPr>
-            <a:normAutofit fontScale="85000" lnSpcReduction="20000"/>
+            <a:normAutofit fontScale="92500" lnSpcReduction="10000"/>
           </a:bodyPr>
           <a:lstStyle/>
           <a:p>
             <a:r>
-              <a:rPr lang="en-US" dirty="0"/>
+              <a:rPr lang="en-US" b="1" dirty="0"/>
               <a:t>Schedule</a:t>
             </a:r>
           </a:p>
@@ -11403,7 +11406,7 @@
             <a:pPr lvl="2"/>
             <a:r>
               <a:rPr lang="en-US" dirty="0"/>
-              <a:t>Hybrid: ~ 1 hour, but we’ve blocked out 2 for extended discussions</a:t>
+              <a:t>~ 1 hour, but we’ve blocked out 2 for extended discussions/office hours</a:t>
             </a:r>
           </a:p>
           <a:p>
@@ -11412,44 +11415,68 @@
               <a:rPr lang="en-US" b="1" dirty="0"/>
               <a:t>Coding Circles</a:t>
             </a:r>
+            <a:endParaRPr lang="en-US" dirty="0"/>
           </a:p>
           <a:p>
             <a:pPr lvl="2"/>
             <a:r>
               <a:rPr lang="en-US" dirty="0"/>
-              <a:t>In person</a:t>
-            </a:r>
-          </a:p>
-          <a:p>
-            <a:pPr lvl="2"/>
-            <a:r>
-              <a:rPr lang="en-US" dirty="0"/>
-              <a:t>Co-working time with us and your cohort to build skills and work on your coding projects</a:t>
+              <a:t>Co-working time me us and your cohort to build skills and work on your coding projects</a:t>
             </a:r>
           </a:p>
           <a:p>
             <a:pPr lvl="3"/>
             <a:r>
               <a:rPr lang="en-US" dirty="0"/>
-              <a:t>Don’t have a project it mind come talk we me after or on slack</a:t>
-            </a:r>
-          </a:p>
-          <a:p>
-            <a:pPr lvl="1"/>
+              <a:t>Ask everyone what they intend to work on</a:t>
+            </a:r>
+          </a:p>
+          <a:p>
+            <a:pPr lvl="4"/>
+            <a:r>
+              <a:rPr lang="en-US" dirty="0"/>
+              <a:t>Either your Project</a:t>
+            </a:r>
+          </a:p>
+          <a:p>
+            <a:pPr lvl="3"/>
             <a:r>
               <a:rPr lang="en-US" b="1" dirty="0"/>
               <a:t>Programing Powerups</a:t>
             </a:r>
           </a:p>
           <a:p>
-            <a:pPr lvl="2"/>
-            <a:r>
-              <a:rPr lang="en-US" dirty="0"/>
-              <a:t>Short tasks to build some concrete skills and knowledge</a:t>
-            </a:r>
-          </a:p>
-          <a:p>
-            <a:pPr marL="914377" lvl="2" indent="0">
+            <a:pPr lvl="4"/>
+            <a:r>
+              <a:rPr lang="en-US" b="1" dirty="0"/>
+              <a:t>https://</a:t>
+            </a:r>
+            <a:r>
+              <a:rPr lang="en-US" b="1" dirty="0" err="1"/>
+              <a:t>uo</a:t>
+            </a:r>
+            <a:r>
+              <a:rPr lang="en-US" b="1" dirty="0"/>
+              <a:t>-data-</a:t>
+            </a:r>
+            <a:r>
+              <a:rPr lang="en-US" b="1" dirty="0" err="1"/>
+              <a:t>science.github.io</a:t>
+            </a:r>
+            <a:r>
+              <a:rPr lang="en-US" b="1" dirty="0"/>
+              <a:t>/NetNeuro2024/</a:t>
+            </a:r>
+          </a:p>
+          <a:p>
+            <a:pPr lvl="4"/>
+            <a:r>
+              <a:rPr lang="en-US" dirty="0"/>
+              <a:t>Tasks to build some concrete skills and knowledge</a:t>
+            </a:r>
+          </a:p>
+          <a:p>
+            <a:pPr marL="1371566" lvl="3" indent="0">
               <a:buNone/>
             </a:pPr>
             <a:r>
@@ -11469,31 +11496,29 @@
             <a:pPr lvl="2"/>
             <a:r>
               <a:rPr lang="en-US" dirty="0"/>
-              <a:t>Posted every Wednesday to our website, and will have some interactive component, but no lecture</a:t>
-            </a:r>
-          </a:p>
-          <a:p>
-            <a:pPr lvl="2"/>
-            <a:r>
-              <a:rPr lang="en-US" dirty="0"/>
               <a:t>Don’t hesitate to use the Data Science channel in slack to ask for questions/help</a:t>
             </a:r>
           </a:p>
           <a:p>
-            <a:r>
-              <a:rPr lang="en-US" dirty="0"/>
-              <a:t>Website – </a:t>
-            </a:r>
-            <a:r>
-              <a:rPr lang="en-US" dirty="0">
+            <a:pPr lvl="1"/>
+            <a:r>
+              <a:rPr lang="en-US" b="1" dirty="0"/>
+              <a:t>Website</a:t>
+            </a:r>
+            <a:r>
+              <a:rPr lang="en-US" dirty="0"/>
+              <a:t> – </a:t>
+            </a:r>
+            <a:r>
+              <a:rPr lang="en-US" b="1" i="1" dirty="0">
                 <a:hlinkClick r:id="rId3"/>
               </a:rPr>
-              <a:t>https://uo-data-science.github.io/NetNeuro2023/</a:t>
-            </a:r>
-            <a:endParaRPr lang="en-US" dirty="0"/>
-          </a:p>
-          <a:p>
-            <a:pPr lvl="1"/>
+              <a:t>https://uo-data-science.github.io/NetNeuro2024/</a:t>
+            </a:r>
+            <a:endParaRPr lang="en-US" b="1" i="1" dirty="0"/>
+          </a:p>
+          <a:p>
+            <a:pPr lvl="2"/>
             <a:r>
               <a:rPr lang="en-US" dirty="0"/>
               <a:t>Schedules, Resources, Programming Powerups</a:t>
@@ -13315,7 +13340,7 @@
             </a:r>
             <a:r>
               <a:rPr lang="en-US" sz="2400" dirty="0"/>
-              <a:t> -</a:t>
+              <a:t>-</a:t>
             </a:r>
             <a:r>
               <a:rPr lang="en-US" dirty="0"/>
@@ -14298,7 +14323,7 @@
         </p:nvSpPr>
         <p:spPr>
           <a:xfrm>
-            <a:off x="722454" y="225444"/>
+            <a:off x="673744" y="63400"/>
             <a:ext cx="10515600" cy="1325563"/>
           </a:xfrm>
         </p:spPr>
@@ -14331,7 +14356,7 @@
         </p:nvSpPr>
         <p:spPr>
           <a:xfrm>
-            <a:off x="625034" y="1388963"/>
+            <a:off x="576324" y="1238838"/>
             <a:ext cx="10613020" cy="4988688"/>
           </a:xfrm>
         </p:spPr>

</xml_diff>